<commit_message>
Lab #10: MiniMIPS, 7/25/18
corrected data
</commit_message>
<xml_diff>
--- a/cs447_rec_lab10_7_25_18.pptx
+++ b/cs447_rec_lab10_7_25_18.pptx
@@ -4057,8 +4057,21 @@
                   <a:srgbClr val="002060"/>
                 </a:solidFill>
               </a:rPr>
-              <a:t>CS447 Recitation #9: 4/2/18</a:t>
-            </a:r>
+              <a:t>CS447 Recitation </a:t>
+            </a:r>
+            <a:r>
+              <a:rPr lang="en-US" sz="2800" dirty="0" smtClean="0">
+                <a:solidFill>
+                  <a:srgbClr val="002060"/>
+                </a:solidFill>
+              </a:rPr>
+              <a:t>#10: 7/25/18</a:t>
+            </a:r>
+            <a:endParaRPr lang="en-US" sz="2800" dirty="0">
+              <a:solidFill>
+                <a:srgbClr val="002060"/>
+              </a:solidFill>
+            </a:endParaRPr>
           </a:p>
         </p:txBody>
       </p:sp>
@@ -4071,7 +4084,7 @@
         <p:spPr>
           <a:xfrm>
             <a:off x="400146" y="1756103"/>
-            <a:ext cx="8201594" cy="1200329"/>
+            <a:ext cx="8201594" cy="1569660"/>
           </a:xfrm>
           <a:prstGeom prst="rect">
             <a:avLst/>
@@ -4108,8 +4121,27 @@
             </a:pPr>
             <a:r>
               <a:rPr lang="en-US" sz="2400" dirty="0"/>
-              <a:t>Overview of Lab #10 </a:t>
-            </a:r>
+              <a:t>Overview of Lab #</a:t>
+            </a:r>
+            <a:r>
+              <a:rPr lang="en-US" sz="2400" dirty="0" smtClean="0"/>
+              <a:t>10</a:t>
+            </a:r>
+          </a:p>
+          <a:p>
+            <a:pPr marL="457200" indent="-457200">
+              <a:buFont typeface="+mj-lt"/>
+              <a:buAutoNum type="arabicPeriod"/>
+            </a:pPr>
+            <a:r>
+              <a:rPr lang="en-US" sz="2400" dirty="0" smtClean="0"/>
+              <a:t>Please sign in.</a:t>
+            </a:r>
+            <a:r>
+              <a:rPr lang="en-US" sz="2400" dirty="0" smtClean="0"/>
+              <a:t> </a:t>
+            </a:r>
+            <a:endParaRPr lang="en-US" sz="2400" dirty="0"/>
           </a:p>
           <a:p>
             <a:pPr marL="457200" indent="-457200">
@@ -4159,7 +4191,13 @@
               <a:rPr lang="en-US" sz="2400" dirty="0">
                 <a:hlinkClick r:id="rId2"/>
               </a:rPr>
-              <a:t>https://github.com/kc13/CS447TK</a:t>
+              <a:t>https://</a:t>
+            </a:r>
+            <a:r>
+              <a:rPr lang="en-US" sz="2400" dirty="0" smtClean="0">
+                <a:hlinkClick r:id="rId2"/>
+              </a:rPr>
+              <a:t>github.com/kc13/CS447</a:t>
             </a:r>
             <a:endParaRPr lang="en-US" sz="2400" dirty="0"/>
           </a:p>
@@ -4175,6 +4213,13 @@
   <p:clrMapOvr>
     <a:masterClrMapping/>
   </p:clrMapOvr>
+  <p:timing>
+    <p:tnLst>
+      <p:par>
+        <p:cTn id="1" dur="indefinite" restart="never" nodeType="tmRoot"/>
+      </p:par>
+    </p:tnLst>
+  </p:timing>
 </p:sld>
 </file>
 
@@ -4433,6 +4478,13 @@
   <p:clrMapOvr>
     <a:masterClrMapping/>
   </p:clrMapOvr>
+  <p:timing>
+    <p:tnLst>
+      <p:par>
+        <p:cTn id="1" dur="indefinite" restart="never" nodeType="tmRoot"/>
+      </p:par>
+    </p:tnLst>
+  </p:timing>
 </p:sld>
 </file>
 
@@ -4582,6 +4634,13 @@
   <p:clrMapOvr>
     <a:masterClrMapping/>
   </p:clrMapOvr>
+  <p:timing>
+    <p:tnLst>
+      <p:par>
+        <p:cTn id="1" dur="indefinite" restart="never" nodeType="tmRoot"/>
+      </p:par>
+    </p:tnLst>
+  </p:timing>
 </p:sld>
 </file>
 
@@ -4731,6 +4790,13 @@
   <p:clrMapOvr>
     <a:masterClrMapping/>
   </p:clrMapOvr>
+  <p:timing>
+    <p:tnLst>
+      <p:par>
+        <p:cTn id="1" dur="indefinite" restart="never" nodeType="tmRoot"/>
+      </p:par>
+    </p:tnLst>
+  </p:timing>
 </p:sld>
 </file>
 
@@ -4883,6 +4949,13 @@
   <p:clrMapOvr>
     <a:masterClrMapping/>
   </p:clrMapOvr>
+  <p:timing>
+    <p:tnLst>
+      <p:par>
+        <p:cTn id="1" dur="indefinite" restart="never" nodeType="tmRoot"/>
+      </p:par>
+    </p:tnLst>
+  </p:timing>
 </p:sld>
 </file>
 
@@ -5037,6 +5110,13 @@
   <p:clrMapOvr>
     <a:masterClrMapping/>
   </p:clrMapOvr>
+  <p:timing>
+    <p:tnLst>
+      <p:par>
+        <p:cTn id="1" dur="indefinite" restart="never" nodeType="tmRoot"/>
+      </p:par>
+    </p:tnLst>
+  </p:timing>
 </p:sld>
 </file>
 
@@ -5760,6 +5840,13 @@
   <p:clrMapOvr>
     <a:masterClrMapping/>
   </p:clrMapOvr>
+  <p:timing>
+    <p:tnLst>
+      <p:par>
+        <p:cTn id="1" dur="indefinite" restart="never" nodeType="tmRoot"/>
+      </p:par>
+    </p:tnLst>
+  </p:timing>
 </p:sld>
 </file>
 
@@ -6343,6 +6430,13 @@
   <p:clrMapOvr>
     <a:masterClrMapping/>
   </p:clrMapOvr>
+  <p:timing>
+    <p:tnLst>
+      <p:par>
+        <p:cTn id="1" dur="indefinite" restart="never" nodeType="tmRoot"/>
+      </p:par>
+    </p:tnLst>
+  </p:timing>
 </p:sld>
 </file>
 
@@ -6585,6 +6679,13 @@
   <p:clrMapOvr>
     <a:masterClrMapping/>
   </p:clrMapOvr>
+  <p:timing>
+    <p:tnLst>
+      <p:par>
+        <p:cTn id="1" dur="indefinite" restart="never" nodeType="tmRoot"/>
+      </p:par>
+    </p:tnLst>
+  </p:timing>
 </p:sld>
 </file>
 
@@ -6844,6 +6945,13 @@
   <p:clrMapOvr>
     <a:masterClrMapping/>
   </p:clrMapOvr>
+  <p:timing>
+    <p:tnLst>
+      <p:par>
+        <p:cTn id="1" dur="indefinite" restart="never" nodeType="tmRoot"/>
+      </p:par>
+    </p:tnLst>
+  </p:timing>
 </p:sld>
 </file>
 
@@ -7009,6 +7117,13 @@
   <p:clrMapOvr>
     <a:masterClrMapping/>
   </p:clrMapOvr>
+  <p:timing>
+    <p:tnLst>
+      <p:par>
+        <p:cTn id="1" dur="indefinite" restart="never" nodeType="tmRoot"/>
+      </p:par>
+    </p:tnLst>
+  </p:timing>
 </p:sld>
 </file>
 

</xml_diff>